<commit_message>
Added Reock Scores to powerpoint
John's Reock scores for the 6 maps were added.
</commit_message>
<xml_diff>
--- a/Compactness_Measures.pptx
+++ b/Compactness_Measures.pptx
@@ -104,6 +104,11 @@
       </a:defRPr>
     </a:lvl9pPr>
   </p:defaultTextStyle>
+  <p:extLst>
+    <p:ext uri="{EFAFB233-063F-42B5-8137-9DF3F51BA10A}">
+      <p15:sldGuideLst xmlns:p15="http://schemas.microsoft.com/office/powerpoint/2012/main"/>
+    </p:ext>
+  </p:extLst>
 </p:presentation>
 </file>
 
@@ -254,7 +259,7 @@
           <a:p>
             <a:fld id="{34F939F3-4B9F-4B44-9D14-107535E8AE65}" type="datetimeFigureOut">
               <a:rPr lang="en-US" smtClean="0"/>
-              <a:t>3/21/2021</a:t>
+              <a:t>3/23/2021</a:t>
             </a:fld>
             <a:endParaRPr lang="en-US"/>
           </a:p>
@@ -452,7 +457,7 @@
           <a:p>
             <a:fld id="{34F939F3-4B9F-4B44-9D14-107535E8AE65}" type="datetimeFigureOut">
               <a:rPr lang="en-US" smtClean="0"/>
-              <a:t>3/21/2021</a:t>
+              <a:t>3/23/2021</a:t>
             </a:fld>
             <a:endParaRPr lang="en-US"/>
           </a:p>
@@ -660,7 +665,7 @@
           <a:p>
             <a:fld id="{34F939F3-4B9F-4B44-9D14-107535E8AE65}" type="datetimeFigureOut">
               <a:rPr lang="en-US" smtClean="0"/>
-              <a:t>3/21/2021</a:t>
+              <a:t>3/23/2021</a:t>
             </a:fld>
             <a:endParaRPr lang="en-US"/>
           </a:p>
@@ -858,7 +863,7 @@
           <a:p>
             <a:fld id="{34F939F3-4B9F-4B44-9D14-107535E8AE65}" type="datetimeFigureOut">
               <a:rPr lang="en-US" smtClean="0"/>
-              <a:t>3/21/2021</a:t>
+              <a:t>3/23/2021</a:t>
             </a:fld>
             <a:endParaRPr lang="en-US"/>
           </a:p>
@@ -1133,7 +1138,7 @@
           <a:p>
             <a:fld id="{34F939F3-4B9F-4B44-9D14-107535E8AE65}" type="datetimeFigureOut">
               <a:rPr lang="en-US" smtClean="0"/>
-              <a:t>3/21/2021</a:t>
+              <a:t>3/23/2021</a:t>
             </a:fld>
             <a:endParaRPr lang="en-US"/>
           </a:p>
@@ -1398,7 +1403,7 @@
           <a:p>
             <a:fld id="{34F939F3-4B9F-4B44-9D14-107535E8AE65}" type="datetimeFigureOut">
               <a:rPr lang="en-US" smtClean="0"/>
-              <a:t>3/21/2021</a:t>
+              <a:t>3/23/2021</a:t>
             </a:fld>
             <a:endParaRPr lang="en-US"/>
           </a:p>
@@ -1810,7 +1815,7 @@
           <a:p>
             <a:fld id="{34F939F3-4B9F-4B44-9D14-107535E8AE65}" type="datetimeFigureOut">
               <a:rPr lang="en-US" smtClean="0"/>
-              <a:t>3/21/2021</a:t>
+              <a:t>3/23/2021</a:t>
             </a:fld>
             <a:endParaRPr lang="en-US"/>
           </a:p>
@@ -1951,7 +1956,7 @@
           <a:p>
             <a:fld id="{34F939F3-4B9F-4B44-9D14-107535E8AE65}" type="datetimeFigureOut">
               <a:rPr lang="en-US" smtClean="0"/>
-              <a:t>3/21/2021</a:t>
+              <a:t>3/23/2021</a:t>
             </a:fld>
             <a:endParaRPr lang="en-US"/>
           </a:p>
@@ -2064,7 +2069,7 @@
           <a:p>
             <a:fld id="{34F939F3-4B9F-4B44-9D14-107535E8AE65}" type="datetimeFigureOut">
               <a:rPr lang="en-US" smtClean="0"/>
-              <a:t>3/21/2021</a:t>
+              <a:t>3/23/2021</a:t>
             </a:fld>
             <a:endParaRPr lang="en-US"/>
           </a:p>
@@ -2375,7 +2380,7 @@
           <a:p>
             <a:fld id="{34F939F3-4B9F-4B44-9D14-107535E8AE65}" type="datetimeFigureOut">
               <a:rPr lang="en-US" smtClean="0"/>
-              <a:t>3/21/2021</a:t>
+              <a:t>3/23/2021</a:t>
             </a:fld>
             <a:endParaRPr lang="en-US"/>
           </a:p>
@@ -2663,7 +2668,7 @@
           <a:p>
             <a:fld id="{34F939F3-4B9F-4B44-9D14-107535E8AE65}" type="datetimeFigureOut">
               <a:rPr lang="en-US" smtClean="0"/>
-              <a:t>3/21/2021</a:t>
+              <a:t>3/23/2021</a:t>
             </a:fld>
             <a:endParaRPr lang="en-US"/>
           </a:p>
@@ -2904,7 +2909,7 @@
           <a:p>
             <a:fld id="{34F939F3-4B9F-4B44-9D14-107535E8AE65}" type="datetimeFigureOut">
               <a:rPr lang="en-US" smtClean="0"/>
-              <a:t>3/21/2021</a:t>
+              <a:t>3/23/2021</a:t>
             </a:fld>
             <a:endParaRPr lang="en-US"/>
           </a:p>
@@ -3365,14 +3370,14 @@
             <p:ph idx="1"/>
             <p:extLst>
               <p:ext uri="{D42A27DB-BD31-4B8C-83A1-F6EECF244321}">
-                <p14:modId xmlns:p14="http://schemas.microsoft.com/office/powerpoint/2010/main" val="3224832363"/>
+                <p14:modId xmlns:p14="http://schemas.microsoft.com/office/powerpoint/2010/main" val="3160103129"/>
               </p:ext>
             </p:extLst>
           </p:nvPr>
         </p:nvGraphicFramePr>
         <p:xfrm>
-          <a:off x="849086" y="1825625"/>
-          <a:ext cx="10504714" cy="2966720"/>
+          <a:off x="510640" y="1825625"/>
+          <a:ext cx="11424061" cy="2966720"/>
         </p:xfrm>
         <a:graphic>
           <a:graphicData uri="http://schemas.openxmlformats.org/drawingml/2006/table">
@@ -3381,31 +3386,38 @@
                 <a:tableStyleId>{5C22544A-7EE6-4342-B048-85BDC9FD1C3A}</a:tableStyleId>
               </a:tblPr>
               <a:tblGrid>
-                <a:gridCol w="2618014">
+                <a:gridCol w="2143908">
                   <a:extLst>
                     <a:ext uri="{9D8B030D-6E8A-4147-A177-3AD203B41FA5}">
                       <a16:colId xmlns:a16="http://schemas.microsoft.com/office/drawing/2014/main" val="3196593434"/>
                     </a:ext>
                   </a:extLst>
                 </a:gridCol>
-                <a:gridCol w="2628900">
+                <a:gridCol w="2435431">
                   <a:extLst>
                     <a:ext uri="{9D8B030D-6E8A-4147-A177-3AD203B41FA5}">
                       <a16:colId xmlns:a16="http://schemas.microsoft.com/office/drawing/2014/main" val="2678926485"/>
                     </a:ext>
                   </a:extLst>
                 </a:gridCol>
-                <a:gridCol w="2628900">
+                <a:gridCol w="2271308">
                   <a:extLst>
                     <a:ext uri="{9D8B030D-6E8A-4147-A177-3AD203B41FA5}">
                       <a16:colId xmlns:a16="http://schemas.microsoft.com/office/drawing/2014/main" val="2669721888"/>
                     </a:ext>
                   </a:extLst>
                 </a:gridCol>
-                <a:gridCol w="2628900">
+                <a:gridCol w="2286707">
                   <a:extLst>
                     <a:ext uri="{9D8B030D-6E8A-4147-A177-3AD203B41FA5}">
                       <a16:colId xmlns:a16="http://schemas.microsoft.com/office/drawing/2014/main" val="631055469"/>
+                    </a:ext>
+                  </a:extLst>
+                </a:gridCol>
+                <a:gridCol w="2286707">
+                  <a:extLst>
+                    <a:ext uri="{9D8B030D-6E8A-4147-A177-3AD203B41FA5}">
+                      <a16:colId xmlns:a16="http://schemas.microsoft.com/office/drawing/2014/main" val="1578805140"/>
                     </a:ext>
                   </a:extLst>
                 </a:gridCol>
@@ -3443,7 +3455,7 @@
                     </a:solidFill>
                   </a:tcPr>
                 </a:tc>
-                <a:tc gridSpan="3">
+                <a:tc gridSpan="4">
                   <a:txBody>
                     <a:bodyPr/>
                     <a:lstStyle/>
@@ -3495,6 +3507,36 @@
                     </a:p>
                   </a:txBody>
                   <a:tcPr/>
+                </a:tc>
+                <a:tc hMerge="1">
+                  <a:txBody>
+                    <a:bodyPr/>
+                    <a:lstStyle/>
+                    <a:p>
+                      <a:pPr algn="ctr"/>
+                      <a:endParaRPr lang="en-US" dirty="0"/>
+                    </a:p>
+                  </a:txBody>
+                  <a:tcPr>
+                    <a:lnL w="38100" cap="flat" cmpd="sng" algn="ctr">
+                      <a:solidFill>
+                        <a:schemeClr val="bg1"/>
+                      </a:solidFill>
+                      <a:prstDash val="solid"/>
+                      <a:round/>
+                      <a:headEnd type="none" w="med" len="med"/>
+                      <a:tailEnd type="none" w="med" len="med"/>
+                    </a:lnL>
+                    <a:lnB w="19050" cap="flat" cmpd="sng" algn="ctr">
+                      <a:solidFill>
+                        <a:schemeClr val="bg1"/>
+                      </a:solidFill>
+                      <a:prstDash val="solid"/>
+                      <a:round/>
+                      <a:headEnd type="none" w="med" len="med"/>
+                      <a:tailEnd type="none" w="med" len="med"/>
+                    </a:lnB>
+                  </a:tcPr>
                 </a:tc>
                 <a:extLst>
                   <a:ext uri="{0D108BD9-81ED-4DB2-BD59-A6C34878D82A}">
@@ -3702,6 +3744,71 @@
                     </a:solidFill>
                   </a:tcPr>
                 </a:tc>
+                <a:tc>
+                  <a:txBody>
+                    <a:bodyPr/>
+                    <a:lstStyle/>
+                    <a:p>
+                      <a:pPr marL="0" algn="ctr" defTabSz="914400" rtl="0" eaLnBrk="1" latinLnBrk="0" hangingPunct="1"/>
+                      <a:r>
+                        <a:rPr lang="en-US" sz="1800" b="1" kern="1200" dirty="0">
+                          <a:solidFill>
+                            <a:schemeClr val="lt1"/>
+                          </a:solidFill>
+                          <a:latin typeface="+mn-lt"/>
+                          <a:ea typeface="+mn-ea"/>
+                          <a:cs typeface="+mn-cs"/>
+                        </a:rPr>
+                        <a:t>Inverse </a:t>
+                      </a:r>
+                      <a:r>
+                        <a:rPr lang="en-US" sz="1800" b="1" kern="1200" dirty="0" err="1">
+                          <a:solidFill>
+                            <a:schemeClr val="lt1"/>
+                          </a:solidFill>
+                          <a:latin typeface="+mn-lt"/>
+                          <a:ea typeface="+mn-ea"/>
+                          <a:cs typeface="+mn-cs"/>
+                        </a:rPr>
+                        <a:t>Reock</a:t>
+                      </a:r>
+                      <a:endParaRPr lang="en-US" sz="1800" b="1" kern="1200" dirty="0">
+                        <a:solidFill>
+                          <a:schemeClr val="lt1"/>
+                        </a:solidFill>
+                        <a:latin typeface="+mn-lt"/>
+                        <a:ea typeface="+mn-ea"/>
+                        <a:cs typeface="+mn-cs"/>
+                      </a:endParaRPr>
+                    </a:p>
+                  </a:txBody>
+                  <a:tcPr>
+                    <a:lnT w="19050" cap="flat" cmpd="sng" algn="ctr">
+                      <a:solidFill>
+                        <a:schemeClr val="bg1"/>
+                      </a:solidFill>
+                      <a:prstDash val="solid"/>
+                      <a:round/>
+                      <a:headEnd type="none" w="med" len="med"/>
+                      <a:tailEnd type="none" w="med" len="med"/>
+                    </a:lnT>
+                    <a:lnB w="38100" cap="flat" cmpd="sng" algn="ctr">
+                      <a:solidFill>
+                        <a:schemeClr val="bg1"/>
+                      </a:solidFill>
+                      <a:prstDash val="solid"/>
+                      <a:round/>
+                      <a:headEnd type="none" w="med" len="med"/>
+                      <a:tailEnd type="none" w="med" len="med"/>
+                    </a:lnB>
+                    <a:solidFill>
+                      <a:schemeClr val="accent1">
+                        <a:lumMod val="60000"/>
+                        <a:lumOff val="40000"/>
+                      </a:schemeClr>
+                    </a:solidFill>
+                  </a:tcPr>
+                </a:tc>
                 <a:extLst>
                   <a:ext uri="{0D108BD9-81ED-4DB2-BD59-A6C34878D82A}">
                     <a16:rowId xmlns:a16="http://schemas.microsoft.com/office/drawing/2014/main" val="335778127"/>
@@ -3833,6 +3940,30 @@
                     </a:lnT>
                   </a:tcPr>
                 </a:tc>
+                <a:tc>
+                  <a:txBody>
+                    <a:bodyPr/>
+                    <a:lstStyle/>
+                    <a:p>
+                      <a:pPr algn="ctr"/>
+                      <a:r>
+                        <a:rPr lang="en-US" dirty="0"/>
+                        <a:t>3.57</a:t>
+                      </a:r>
+                    </a:p>
+                  </a:txBody>
+                  <a:tcPr>
+                    <a:lnT w="38100" cap="flat" cmpd="sng" algn="ctr">
+                      <a:solidFill>
+                        <a:schemeClr val="bg1"/>
+                      </a:solidFill>
+                      <a:prstDash val="solid"/>
+                      <a:round/>
+                      <a:headEnd type="none" w="med" len="med"/>
+                      <a:tailEnd type="none" w="med" len="med"/>
+                    </a:lnT>
+                  </a:tcPr>
+                </a:tc>
                 <a:extLst>
                   <a:ext uri="{0D108BD9-81ED-4DB2-BD59-A6C34878D82A}">
                     <a16:rowId xmlns:a16="http://schemas.microsoft.com/office/drawing/2014/main" val="3293321598"/>
@@ -3926,6 +4057,20 @@
                   </a:txBody>
                   <a:tcPr/>
                 </a:tc>
+                <a:tc>
+                  <a:txBody>
+                    <a:bodyPr/>
+                    <a:lstStyle/>
+                    <a:p>
+                      <a:pPr algn="ctr"/>
+                      <a:r>
+                        <a:rPr lang="en-US" dirty="0"/>
+                        <a:t>2.56</a:t>
+                      </a:r>
+                    </a:p>
+                  </a:txBody>
+                  <a:tcPr/>
+                </a:tc>
                 <a:extLst>
                   <a:ext uri="{0D108BD9-81ED-4DB2-BD59-A6C34878D82A}">
                     <a16:rowId xmlns:a16="http://schemas.microsoft.com/office/drawing/2014/main" val="832318853"/>
@@ -3948,7 +4093,7 @@
                           <a:ea typeface="+mn-ea"/>
                           <a:cs typeface="+mn-cs"/>
                         </a:rPr>
-                        <a:t>Current Congressional</a:t>
+                        <a:t>Current Congress</a:t>
                       </a:r>
                     </a:p>
                   </a:txBody>
@@ -4014,6 +4159,20 @@
                       <a:r>
                         <a:rPr lang="en-US" dirty="0"/>
                         <a:t>1.37</a:t>
+                      </a:r>
+                    </a:p>
+                  </a:txBody>
+                  <a:tcPr/>
+                </a:tc>
+                <a:tc>
+                  <a:txBody>
+                    <a:bodyPr/>
+                    <a:lstStyle/>
+                    <a:p>
+                      <a:pPr algn="ctr"/>
+                      <a:r>
+                        <a:rPr lang="en-US" dirty="0"/>
+                        <a:t>2.56</a:t>
                       </a:r>
                     </a:p>
                   </a:txBody>
@@ -4112,6 +4271,20 @@
                   </a:txBody>
                   <a:tcPr/>
                 </a:tc>
+                <a:tc>
+                  <a:txBody>
+                    <a:bodyPr/>
+                    <a:lstStyle/>
+                    <a:p>
+                      <a:pPr algn="ctr"/>
+                      <a:r>
+                        <a:rPr lang="en-US" dirty="0"/>
+                        <a:t>2.33</a:t>
+                      </a:r>
+                    </a:p>
+                  </a:txBody>
+                  <a:tcPr/>
+                </a:tc>
                 <a:extLst>
                   <a:ext uri="{0D108BD9-81ED-4DB2-BD59-A6C34878D82A}">
                     <a16:rowId xmlns:a16="http://schemas.microsoft.com/office/drawing/2014/main" val="774279663"/>
@@ -4205,6 +4378,20 @@
                   </a:txBody>
                   <a:tcPr/>
                 </a:tc>
+                <a:tc>
+                  <a:txBody>
+                    <a:bodyPr/>
+                    <a:lstStyle/>
+                    <a:p>
+                      <a:pPr algn="ctr"/>
+                      <a:r>
+                        <a:rPr lang="en-US" dirty="0"/>
+                        <a:t>2.38</a:t>
+                      </a:r>
+                    </a:p>
+                  </a:txBody>
+                  <a:tcPr/>
+                </a:tc>
                 <a:extLst>
                   <a:ext uri="{0D108BD9-81ED-4DB2-BD59-A6C34878D82A}">
                     <a16:rowId xmlns:a16="http://schemas.microsoft.com/office/drawing/2014/main" val="734415045"/>
@@ -4227,7 +4414,7 @@
                           <a:ea typeface="+mn-ea"/>
                           <a:cs typeface="+mn-cs"/>
                         </a:rPr>
-                        <a:t>Congressional Exemplar</a:t>
+                        <a:t>Congress Exemplar</a:t>
                       </a:r>
                     </a:p>
                   </a:txBody>
@@ -4293,6 +4480,20 @@
                       <a:r>
                         <a:rPr lang="en-US" dirty="0"/>
                         <a:t>1.31</a:t>
+                      </a:r>
+                    </a:p>
+                  </a:txBody>
+                  <a:tcPr/>
+                </a:tc>
+                <a:tc>
+                  <a:txBody>
+                    <a:bodyPr/>
+                    <a:lstStyle/>
+                    <a:p>
+                      <a:pPr algn="ctr"/>
+                      <a:r>
+                        <a:rPr lang="en-US" dirty="0"/>
+                        <a:t>2.17</a:t>
                       </a:r>
                     </a:p>
                   </a:txBody>

</xml_diff>